<commit_message>
slides of clustering done
</commit_message>
<xml_diff>
--- a/slides/Slides deck.pptx
+++ b/slides/Slides deck.pptx
@@ -9129,7 +9129,7 @@
         <p:spPr>
           <a:xfrm>
             <a:off x="353801" y="1324480"/>
-            <a:ext cx="7751974" cy="1169551"/>
+            <a:ext cx="7751974" cy="738664"/>
           </a:xfrm>
           <a:prstGeom prst="rect">
             <a:avLst/>
@@ -9187,42 +9187,6 @@
               <a:t>. It combines with the RFM segmentations to support a more comprehensive and flexible marketing strategy.</a:t>
             </a:r>
           </a:p>
-          <a:p>
-            <a:pPr marL="285750" indent="-285750">
-              <a:buFont typeface="Arial" panose="020B0604020202020204" pitchFamily="34" charset="0"/>
-              <a:buChar char="•"/>
-            </a:pPr>
-            <a:r>
-              <a:rPr lang="en-AU" sz="1400" dirty="0" smtClean="0">
-                <a:solidFill>
-                  <a:schemeClr val="bg1">
-                    <a:lumMod val="50000"/>
-                  </a:schemeClr>
-                </a:solidFill>
-              </a:rPr>
-              <a:t>Each cluster shares roughly 25% of the total number of customers</a:t>
-            </a:r>
-            <a:endParaRPr lang="en-GB" sz="1400" dirty="0" smtClean="0">
-              <a:solidFill>
-                <a:schemeClr val="bg1">
-                  <a:lumMod val="50000"/>
-                </a:schemeClr>
-              </a:solidFill>
-            </a:endParaRPr>
-          </a:p>
-          <a:p>
-            <a:pPr marL="285750" indent="-285750">
-              <a:buFont typeface="Arial" panose="020B0604020202020204" pitchFamily="34" charset="0"/>
-              <a:buChar char="•"/>
-            </a:pPr>
-            <a:endParaRPr lang="en-GB" sz="1400" dirty="0">
-              <a:solidFill>
-                <a:schemeClr val="bg1">
-                  <a:lumMod val="50000"/>
-                </a:schemeClr>
-              </a:solidFill>
-            </a:endParaRPr>
-          </a:p>
         </p:txBody>
       </p:sp>
       <p:sp>
@@ -9729,20 +9693,10 @@
                           <a:effectLst/>
                           <a:latin typeface="Calibri"/>
                         </a:rPr>
-                        <a:t>b. Frequent </a:t>
+                        <a:t>b. Frequent and </a:t>
                       </a:r>
                       <a:r>
-                        <a:rPr lang="en-US" sz="900" b="1" i="0" u="none" strike="noStrike">
-                          <a:solidFill>
-                            <a:srgbClr val="000000"/>
-                          </a:solidFill>
-                          <a:effectLst/>
-                          <a:latin typeface="Calibri"/>
-                        </a:rPr>
-                        <a:t>and </a:t>
-                      </a:r>
-                      <a:r>
-                        <a:rPr lang="en-US" sz="900" b="1" i="0" u="none" strike="noStrike" smtClean="0">
+                        <a:rPr lang="en-US" sz="900" b="1" i="0" u="none" strike="noStrike" dirty="0" smtClean="0">
                           <a:solidFill>
                             <a:srgbClr val="000000"/>
                           </a:solidFill>
@@ -13171,9 +13125,209 @@
           <a:chExt cx="0" cy="0"/>
         </a:xfrm>
       </p:grpSpPr>
+      <p:sp>
+        <p:nvSpPr>
+          <p:cNvPr id="11" name="TextBox 10"/>
+          <p:cNvSpPr txBox="1"/>
+          <p:nvPr/>
+        </p:nvSpPr>
+        <p:spPr>
+          <a:xfrm>
+            <a:off x="353801" y="1324480"/>
+            <a:ext cx="4389476" cy="3323987"/>
+          </a:xfrm>
+          <a:prstGeom prst="rect">
+            <a:avLst/>
+          </a:prstGeom>
+          <a:noFill/>
+        </p:spPr>
+        <p:txBody>
+          <a:bodyPr wrap="square" rtlCol="0">
+            <a:spAutoFit/>
+          </a:bodyPr>
+          <a:lstStyle/>
+          <a:p>
+            <a:pPr marL="285750" indent="-285750">
+              <a:buFont typeface="Arial" panose="020B0604020202020204" pitchFamily="34" charset="0"/>
+              <a:buChar char="•"/>
+            </a:pPr>
+            <a:r>
+              <a:rPr lang="en-AU" sz="1400" dirty="0" smtClean="0">
+                <a:solidFill>
+                  <a:schemeClr val="bg1">
+                    <a:lumMod val="50000"/>
+                  </a:schemeClr>
+                </a:solidFill>
+              </a:rPr>
+              <a:t>A. Strong but Simple: Bet more and diversely, but does not have a good outcome</a:t>
+            </a:r>
+          </a:p>
+          <a:p>
+            <a:pPr marL="285750" indent="-285750">
+              <a:buFont typeface="Arial" panose="020B0604020202020204" pitchFamily="34" charset="0"/>
+              <a:buChar char="•"/>
+            </a:pPr>
+            <a:r>
+              <a:rPr lang="en-AU" sz="1400" dirty="0" smtClean="0">
+                <a:solidFill>
+                  <a:schemeClr val="bg1">
+                    <a:lumMod val="50000"/>
+                  </a:schemeClr>
+                </a:solidFill>
+              </a:rPr>
+              <a:t>B. Frequent and Care: Bet frequently, but cancel a lot</a:t>
+            </a:r>
+          </a:p>
+          <a:p>
+            <a:pPr marL="285750" indent="-285750">
+              <a:buFont typeface="Arial" panose="020B0604020202020204" pitchFamily="34" charset="0"/>
+              <a:buChar char="•"/>
+            </a:pPr>
+            <a:r>
+              <a:rPr lang="en-AU" sz="1400" dirty="0" smtClean="0">
+                <a:solidFill>
+                  <a:schemeClr val="bg1">
+                    <a:lumMod val="50000"/>
+                  </a:schemeClr>
+                </a:solidFill>
+              </a:rPr>
+              <a:t>C. Fast then Win!: Bet less and early, but wins a lot</a:t>
+            </a:r>
+          </a:p>
+          <a:p>
+            <a:pPr marL="285750" indent="-285750">
+              <a:buFont typeface="Arial" panose="020B0604020202020204" pitchFamily="34" charset="0"/>
+              <a:buChar char="•"/>
+            </a:pPr>
+            <a:r>
+              <a:rPr lang="en-AU" sz="1400" dirty="0" smtClean="0">
+                <a:solidFill>
+                  <a:schemeClr val="bg1">
+                    <a:lumMod val="50000"/>
+                  </a:schemeClr>
+                </a:solidFill>
+              </a:rPr>
+              <a:t>D. Casual and Bold: No strategy, just casually play</a:t>
+            </a:r>
+          </a:p>
+          <a:p>
+            <a:pPr marL="285750" indent="-285750">
+              <a:buFont typeface="Arial" panose="020B0604020202020204" pitchFamily="34" charset="0"/>
+              <a:buChar char="•"/>
+            </a:pPr>
+            <a:endParaRPr lang="en-AU" sz="1400" dirty="0">
+              <a:solidFill>
+                <a:schemeClr val="bg1">
+                  <a:lumMod val="50000"/>
+                </a:schemeClr>
+              </a:solidFill>
+            </a:endParaRPr>
+          </a:p>
+          <a:p>
+            <a:pPr marL="285750" indent="-285750">
+              <a:buFont typeface="Arial" panose="020B0604020202020204" pitchFamily="34" charset="0"/>
+              <a:buChar char="•"/>
+            </a:pPr>
+            <a:endParaRPr lang="en-AU" sz="1400" dirty="0" smtClean="0">
+              <a:solidFill>
+                <a:schemeClr val="bg1">
+                  <a:lumMod val="50000"/>
+                </a:schemeClr>
+              </a:solidFill>
+            </a:endParaRPr>
+          </a:p>
+          <a:p>
+            <a:pPr marL="285750" indent="-285750">
+              <a:buFont typeface="Arial" panose="020B0604020202020204" pitchFamily="34" charset="0"/>
+              <a:buChar char="•"/>
+            </a:pPr>
+            <a:endParaRPr lang="en-AU" sz="1400" dirty="0">
+              <a:solidFill>
+                <a:schemeClr val="bg1">
+                  <a:lumMod val="50000"/>
+                </a:schemeClr>
+              </a:solidFill>
+            </a:endParaRPr>
+          </a:p>
+          <a:p>
+            <a:r>
+              <a:rPr lang="en-AU" sz="1400" b="1" dirty="0" smtClean="0">
+                <a:solidFill>
+                  <a:schemeClr val="bg1">
+                    <a:lumMod val="50000"/>
+                  </a:schemeClr>
+                </a:solidFill>
+              </a:rPr>
+              <a:t>Gut Findings from the Clusters Profiles</a:t>
+            </a:r>
+            <a:endParaRPr lang="en-AU" sz="1400" b="1" dirty="0">
+              <a:solidFill>
+                <a:schemeClr val="bg1">
+                  <a:lumMod val="50000"/>
+                </a:schemeClr>
+              </a:solidFill>
+            </a:endParaRPr>
+          </a:p>
+          <a:p>
+            <a:pPr marL="285750" indent="-285750">
+              <a:buFont typeface="Arial" panose="020B0604020202020204" pitchFamily="34" charset="0"/>
+              <a:buChar char="•"/>
+            </a:pPr>
+            <a:r>
+              <a:rPr lang="en-AU" sz="1400" dirty="0" smtClean="0">
+                <a:solidFill>
+                  <a:schemeClr val="bg1">
+                    <a:lumMod val="50000"/>
+                  </a:schemeClr>
+                </a:solidFill>
+              </a:rPr>
+              <a:t>Those who placed the bet early and focus on smaller number of bets seem to gain more profit than others</a:t>
+            </a:r>
+          </a:p>
+          <a:p>
+            <a:pPr marL="285750" indent="-285750">
+              <a:buFont typeface="Arial" panose="020B0604020202020204" pitchFamily="34" charset="0"/>
+              <a:buChar char="•"/>
+            </a:pPr>
+            <a:r>
+              <a:rPr lang="en-GB" sz="1400" dirty="0" smtClean="0">
+                <a:solidFill>
+                  <a:schemeClr val="bg1">
+                    <a:lumMod val="50000"/>
+                  </a:schemeClr>
+                </a:solidFill>
+              </a:rPr>
+              <a:t>Those who put more transactions into a single bet and carefully considering cancelling offers, turns out to have a higher win rate than others</a:t>
+            </a:r>
+          </a:p>
+          <a:p>
+            <a:pPr marL="285750" indent="-285750">
+              <a:buFont typeface="Arial" panose="020B0604020202020204" pitchFamily="34" charset="0"/>
+              <a:buChar char="•"/>
+            </a:pPr>
+            <a:r>
+              <a:rPr lang="en-GB" sz="1400" dirty="0" smtClean="0">
+                <a:solidFill>
+                  <a:schemeClr val="bg1">
+                    <a:lumMod val="50000"/>
+                  </a:schemeClr>
+                </a:solidFill>
+              </a:rPr>
+              <a:t>More bets do not mean more win/profit</a:t>
+            </a:r>
+            <a:endParaRPr lang="en-GB" sz="1400" dirty="0" smtClean="0">
+              <a:solidFill>
+                <a:schemeClr val="bg1">
+                  <a:lumMod val="50000"/>
+                </a:schemeClr>
+              </a:solidFill>
+            </a:endParaRPr>
+          </a:p>
+        </p:txBody>
+      </p:sp>
       <p:pic>
         <p:nvPicPr>
-          <p:cNvPr id="8" name="Picture 7" descr="plot_kmeans_vertical.png"/>
+          <p:cNvPr id="12" name="Picture 11" descr="plot_kmeans_vertical.png"/>
           <p:cNvPicPr>
             <a:picLocks noChangeAspect="1"/>
           </p:cNvPicPr>
@@ -13201,78 +13355,6 @@
           </a:prstGeom>
         </p:spPr>
       </p:pic>
-      <p:sp>
-        <p:nvSpPr>
-          <p:cNvPr id="11" name="TextBox 10"/>
-          <p:cNvSpPr txBox="1"/>
-          <p:nvPr/>
-        </p:nvSpPr>
-        <p:spPr>
-          <a:xfrm>
-            <a:off x="353801" y="1324480"/>
-            <a:ext cx="4389476" cy="738664"/>
-          </a:xfrm>
-          <a:prstGeom prst="rect">
-            <a:avLst/>
-          </a:prstGeom>
-          <a:noFill/>
-        </p:spPr>
-        <p:txBody>
-          <a:bodyPr wrap="square" rtlCol="0">
-            <a:spAutoFit/>
-          </a:bodyPr>
-          <a:lstStyle/>
-          <a:p>
-            <a:pPr marL="285750" indent="-285750">
-              <a:buFont typeface="Arial" panose="020B0604020202020204" pitchFamily="34" charset="0"/>
-              <a:buChar char="•"/>
-            </a:pPr>
-            <a:r>
-              <a:rPr lang="en-AU" sz="1400" dirty="0" smtClean="0">
-                <a:solidFill>
-                  <a:schemeClr val="bg1">
-                    <a:lumMod val="50000"/>
-                  </a:schemeClr>
-                </a:solidFill>
-              </a:rPr>
-              <a:t>A. Strong but Simple: Bet more and diversely, but does not have a good outcome</a:t>
-            </a:r>
-          </a:p>
-          <a:p>
-            <a:pPr marL="285750" indent="-285750">
-              <a:buFont typeface="Arial" panose="020B0604020202020204" pitchFamily="34" charset="0"/>
-              <a:buChar char="•"/>
-            </a:pPr>
-            <a:r>
-              <a:rPr lang="en-AU" sz="1400" dirty="0" smtClean="0">
-                <a:solidFill>
-                  <a:schemeClr val="bg1">
-                    <a:lumMod val="50000"/>
-                  </a:schemeClr>
-                </a:solidFill>
-              </a:rPr>
-              <a:t>B. Frequent and Reactive: Bet frequently, but </a:t>
-            </a:r>
-            <a:r>
-              <a:rPr lang="en-AU" sz="1400" dirty="0" err="1" smtClean="0">
-                <a:solidFill>
-                  <a:schemeClr val="bg1">
-                    <a:lumMod val="50000"/>
-                  </a:schemeClr>
-                </a:solidFill>
-              </a:rPr>
-              <a:t>cancell</a:t>
-            </a:r>
-            <a:endParaRPr lang="en-GB" sz="1400" dirty="0">
-              <a:solidFill>
-                <a:schemeClr val="bg1">
-                  <a:lumMod val="50000"/>
-                </a:schemeClr>
-              </a:solidFill>
-            </a:endParaRPr>
-          </a:p>
-        </p:txBody>
-      </p:sp>
     </p:spTree>
     <p:extLst>
       <p:ext uri="{BB962C8B-B14F-4D97-AF65-F5344CB8AC3E}">

</xml_diff>